<commit_message>
changed smoe slides, specially the ones on loss-less coding, and added ffmpeg
</commit_message>
<xml_diff>
--- a/lectures/5. Audio coding standards.pptx
+++ b/lectures/5. Audio coding standards.pptx
@@ -5,7 +5,7 @@
     <p:sldMasterId id="2147483659" r:id="rId1"/>
   </p:sldMasterIdLst>
   <p:notesMasterIdLst>
-    <p:notesMasterId r:id="rId28"/>
+    <p:notesMasterId r:id="rId29"/>
   </p:notesMasterIdLst>
   <p:sldIdLst>
     <p:sldId id="256" r:id="rId2"/>
@@ -32,8 +32,9 @@
     <p:sldId id="277" r:id="rId23"/>
     <p:sldId id="278" r:id="rId24"/>
     <p:sldId id="279" r:id="rId25"/>
-    <p:sldId id="280" r:id="rId26"/>
-    <p:sldId id="284" r:id="rId27"/>
+    <p:sldId id="287" r:id="rId26"/>
+    <p:sldId id="288" r:id="rId27"/>
+    <p:sldId id="284" r:id="rId28"/>
   </p:sldIdLst>
   <p:sldSz cx="9144000" cy="5143500" type="screen16x9"/>
   <p:notesSz cx="6858000" cy="9144000"/>
@@ -1171,7 +1172,7 @@
         </p:nvSpPr>
         <p:spPr>
           <a:xfrm>
-            <a:off x="381300" y="685800"/>
+            <a:off x="381000" y="685800"/>
             <a:ext cx="6096000" cy="3429000"/>
           </a:xfrm>
           <a:custGeom>
@@ -2540,110 +2541,6 @@
 </p:notes>
 </file>
 
-<file path=ppt/notesSlides/notesSlide25.xml><?xml version="1.0" encoding="utf-8"?>
-<p:notes xmlns:a="http://schemas.openxmlformats.org/drawingml/2006/main" xmlns:r="http://schemas.openxmlformats.org/officeDocument/2006/relationships" xmlns:p="http://schemas.openxmlformats.org/presentationml/2006/main" showMasterSp="0" showMasterPhAnim="0">
-  <p:cSld>
-    <p:spTree>
-      <p:nvGrpSpPr>
-        <p:cNvPr id="1" name="Shape 193"/>
-        <p:cNvGrpSpPr/>
-        <p:nvPr/>
-      </p:nvGrpSpPr>
-      <p:grpSpPr>
-        <a:xfrm>
-          <a:off x="0" y="0"/>
-          <a:ext cx="0" cy="0"/>
-          <a:chOff x="0" y="0"/>
-          <a:chExt cx="0" cy="0"/>
-        </a:xfrm>
-      </p:grpSpPr>
-      <p:sp>
-        <p:nvSpPr>
-          <p:cNvPr id="194" name="Google Shape;194;g2f404573549_0_65:notes"/>
-          <p:cNvSpPr>
-            <a:spLocks noGrp="1" noRot="1" noChangeAspect="1"/>
-          </p:cNvSpPr>
-          <p:nvPr>
-            <p:ph type="sldImg" idx="2"/>
-          </p:nvPr>
-        </p:nvSpPr>
-        <p:spPr>
-          <a:xfrm>
-            <a:off x="381300" y="685800"/>
-            <a:ext cx="6096000" cy="3429000"/>
-          </a:xfrm>
-          <a:custGeom>
-            <a:avLst/>
-            <a:gdLst/>
-            <a:ahLst/>
-            <a:cxnLst/>
-            <a:rect l="l" t="t" r="r" b="b"/>
-            <a:pathLst>
-              <a:path w="120000" h="120000" extrusionOk="0">
-                <a:moveTo>
-                  <a:pt x="0" y="0"/>
-                </a:moveTo>
-                <a:lnTo>
-                  <a:pt x="120000" y="0"/>
-                </a:lnTo>
-                <a:lnTo>
-                  <a:pt x="120000" y="120000"/>
-                </a:lnTo>
-                <a:lnTo>
-                  <a:pt x="0" y="120000"/>
-                </a:lnTo>
-                <a:close/>
-              </a:path>
-            </a:pathLst>
-          </a:custGeom>
-        </p:spPr>
-      </p:sp>
-      <p:sp>
-        <p:nvSpPr>
-          <p:cNvPr id="195" name="Google Shape;195;g2f404573549_0_65:notes"/>
-          <p:cNvSpPr txBox="1">
-            <a:spLocks noGrp="1"/>
-          </p:cNvSpPr>
-          <p:nvPr>
-            <p:ph type="body" idx="1"/>
-          </p:nvPr>
-        </p:nvSpPr>
-        <p:spPr>
-          <a:xfrm>
-            <a:off x="685800" y="4343400"/>
-            <a:ext cx="5486400" cy="4114800"/>
-          </a:xfrm>
-          <a:prstGeom prst="rect">
-            <a:avLst/>
-          </a:prstGeom>
-        </p:spPr>
-        <p:txBody>
-          <a:bodyPr spcFirstLastPara="1" wrap="square" lIns="91425" tIns="91425" rIns="91425" bIns="91425" anchor="t" anchorCtr="0">
-            <a:noAutofit/>
-          </a:bodyPr>
-          <a:lstStyle/>
-          <a:p>
-            <a:pPr marL="0" lvl="0" indent="0" algn="l" rtl="0">
-              <a:spcBef>
-                <a:spcPts val="0"/>
-              </a:spcBef>
-              <a:spcAft>
-                <a:spcPts val="0"/>
-              </a:spcAft>
-              <a:buNone/>
-            </a:pPr>
-            <a:endParaRPr/>
-          </a:p>
-        </p:txBody>
-      </p:sp>
-    </p:spTree>
-  </p:cSld>
-  <p:clrMapOvr>
-    <a:masterClrMapping/>
-  </p:clrMapOvr>
-</p:notes>
-</file>
-
 <file path=ppt/notesSlides/notesSlide3.xml><?xml version="1.0" encoding="utf-8"?>
 <p:notes xmlns:a="http://schemas.openxmlformats.org/drawingml/2006/main" xmlns:r="http://schemas.openxmlformats.org/officeDocument/2006/relationships" xmlns:p="http://schemas.openxmlformats.org/presentationml/2006/main" showMasterSp="0" showMasterPhAnim="0">
   <p:cSld>
@@ -3297,7 +3194,7 @@
         </p:nvSpPr>
         <p:spPr>
           <a:xfrm>
-            <a:off x="381300" y="685800"/>
+            <a:off x="381000" y="685800"/>
             <a:ext cx="6096000" cy="3429000"/>
           </a:xfrm>
           <a:custGeom>
@@ -8743,10 +8640,14 @@
               <a:buChar char="●"/>
             </a:pPr>
             <a:r>
-              <a:rPr lang="en"/>
-              <a:t>Temporal noise shaping (TNS) tool helps to control temporal shape of quantization noise.</a:t>
-            </a:r>
-            <a:endParaRPr/>
+              <a:rPr lang="en" b="1" dirty="0"/>
+              <a:t>Temporal noise shaping </a:t>
+            </a:r>
+            <a:r>
+              <a:rPr lang="en" dirty="0"/>
+              <a:t>(TNS) tool helps to control temporal shape of quantization noise.</a:t>
+            </a:r>
+            <a:endParaRPr dirty="0"/>
           </a:p>
           <a:p>
             <a:pPr marL="457200" lvl="0" indent="-342900" algn="l" rtl="0">
@@ -8760,10 +8661,14 @@
               <a:buChar char="●"/>
             </a:pPr>
             <a:r>
-              <a:rPr lang="en"/>
-              <a:t>Intensity coding and the coupling reduces perceptually irrelevant information by combining multiple channels in high-frequency regions into a single channel.</a:t>
-            </a:r>
-            <a:endParaRPr/>
+              <a:rPr lang="en" b="1" dirty="0"/>
+              <a:t>Intensity coding </a:t>
+            </a:r>
+            <a:r>
+              <a:rPr lang="en" dirty="0"/>
+              <a:t>and the coupling reduces perceptually irrelevant information by combining multiple channels in high-frequency regions into a single channel.</a:t>
+            </a:r>
+            <a:endParaRPr dirty="0"/>
           </a:p>
           <a:p>
             <a:pPr marL="457200" lvl="0" indent="-342900" algn="l" rtl="0">
@@ -8777,10 +8682,14 @@
               <a:buChar char="●"/>
             </a:pPr>
             <a:r>
-              <a:rPr lang="en"/>
-              <a:t>Prediction tool further removes redundancies between adjacent frames.</a:t>
-            </a:r>
-            <a:endParaRPr/>
+              <a:rPr lang="en" b="1" dirty="0"/>
+              <a:t>Prediction tool </a:t>
+            </a:r>
+            <a:r>
+              <a:rPr lang="en" dirty="0"/>
+              <a:t>further removes redundancies between adjacent frames.</a:t>
+            </a:r>
+            <a:endParaRPr dirty="0"/>
           </a:p>
           <a:p>
             <a:pPr marL="457200" lvl="0" indent="-342900" algn="l" rtl="0">
@@ -8794,10 +8703,14 @@
               <a:buChar char="●"/>
             </a:pPr>
             <a:r>
-              <a:rPr lang="en"/>
-              <a:t>M/S coding removes stereo redundancy based on coding the sum and difference signal instead of the left and right channels.</a:t>
-            </a:r>
-            <a:endParaRPr/>
+              <a:rPr lang="en" b="1" dirty="0"/>
+              <a:t>M/S coding </a:t>
+            </a:r>
+            <a:r>
+              <a:rPr lang="en" dirty="0"/>
+              <a:t>removes stereo redundancy based on coding the sum and difference signal instead of the left and right channels.</a:t>
+            </a:r>
+            <a:endParaRPr dirty="0"/>
           </a:p>
         </p:txBody>
       </p:sp>
@@ -8880,8 +8793,8 @@
         </p:nvSpPr>
         <p:spPr>
           <a:xfrm>
-            <a:off x="311700" y="1017725"/>
-            <a:ext cx="8520600" cy="3851100"/>
+            <a:off x="311700" y="823658"/>
+            <a:ext cx="8520600" cy="4104329"/>
           </a:xfrm>
           <a:prstGeom prst="rect">
             <a:avLst/>
@@ -9963,7 +9876,23 @@
             </a:pPr>
             <a:r>
               <a:rPr lang="en" dirty="0"/>
-              <a:t>Lossless audio coding</a:t>
+              <a:t>Lossless audio coding (FLAC)</a:t>
+            </a:r>
+          </a:p>
+          <a:p>
+            <a:pPr marL="457200" lvl="0" indent="-342900" algn="l" rtl="0">
+              <a:spcBef>
+                <a:spcPts val="0"/>
+              </a:spcBef>
+              <a:spcAft>
+                <a:spcPts val="0"/>
+              </a:spcAft>
+              <a:buSzPts val="1800"/>
+              <a:buChar char="●"/>
+            </a:pPr>
+            <a:r>
+              <a:rPr lang="en" dirty="0" err="1"/>
+              <a:t>FFmpeg</a:t>
             </a:r>
             <a:endParaRPr dirty="0"/>
           </a:p>
@@ -10417,7 +10346,7 @@
             </a:pPr>
             <a:r>
               <a:rPr lang="en" dirty="0"/>
-              <a:t>De factor standard in most movie houses and home theaters.</a:t>
+              <a:t>De facto standard in most movie houses and home theaters.</a:t>
             </a:r>
             <a:br>
               <a:rPr lang="en" dirty="0"/>
@@ -10716,48 +10645,12 @@
             </a:pPr>
             <a:r>
               <a:rPr lang="en" dirty="0"/>
-              <a:t>Lossless audio coding algorithms (L</a:t>
-            </a:r>
-            <a:r>
-              <a:rPr lang="en" baseline="30000" dirty="0"/>
-              <a:t>2</a:t>
-            </a:r>
-            <a:r>
-              <a:rPr lang="en" dirty="0"/>
-              <a:t>AC)</a:t>
+              <a:t>Lossless audio coding (FLAC)</a:t>
             </a:r>
             <a:endParaRPr dirty="0"/>
           </a:p>
         </p:txBody>
       </p:sp>
-      <p:pic>
-        <p:nvPicPr>
-          <p:cNvPr id="192" name="Google Shape;192;p36"/>
-          <p:cNvPicPr preferRelativeResize="0"/>
-          <p:nvPr/>
-        </p:nvPicPr>
-        <p:blipFill>
-          <a:blip r:embed="rId3">
-            <a:alphaModFix/>
-          </a:blip>
-          <a:stretch>
-            <a:fillRect/>
-          </a:stretch>
-        </p:blipFill>
-        <p:spPr>
-          <a:xfrm>
-            <a:off x="4212434" y="560323"/>
-            <a:ext cx="4357851" cy="4495252"/>
-          </a:xfrm>
-          <a:prstGeom prst="rect">
-            <a:avLst/>
-          </a:prstGeom>
-          <a:noFill/>
-          <a:ln>
-            <a:noFill/>
-          </a:ln>
-        </p:spPr>
-      </p:pic>
       <p:sp>
         <p:nvSpPr>
           <p:cNvPr id="2" name="Google Shape;180;p34">
@@ -10776,8 +10669,8 @@
         </p:nvSpPr>
         <p:spPr>
           <a:xfrm>
-            <a:off x="311004" y="863550"/>
-            <a:ext cx="3901429" cy="3416400"/>
+            <a:off x="311004" y="725936"/>
+            <a:ext cx="8418296" cy="1745038"/>
           </a:xfrm>
           <a:prstGeom prst="rect">
             <a:avLst/>
@@ -10785,7 +10678,7 @@
         </p:spPr>
         <p:txBody>
           <a:bodyPr spcFirstLastPara="1" wrap="square" lIns="91425" tIns="91425" rIns="91425" bIns="91425" anchor="t" anchorCtr="0">
-            <a:normAutofit/>
+            <a:normAutofit lnSpcReduction="10000"/>
           </a:bodyPr>
           <a:lstStyle/>
           <a:p>
@@ -10802,22 +10695,49 @@
           </a:p>
           <a:p>
             <a:r>
-              <a:rPr lang="en" dirty="0"/>
-              <a:t>Not used in real-time and Internet streaming applications.</a:t>
-            </a:r>
-          </a:p>
-          <a:p>
-            <a:r>
-              <a:rPr lang="en" dirty="0"/>
-              <a:t>Employ psychoacoustic principles and time-frequency mapping (not exact replica)</a:t>
-            </a:r>
-            <a:br>
-              <a:rPr lang="en" dirty="0"/>
-            </a:br>
+              <a:rPr lang="en-US" dirty="0"/>
+              <a:t>Similar to how Zip works, except with FLAC you will get much better compression because it is designed specifically for audio.</a:t>
+            </a:r>
+          </a:p>
+          <a:p>
+            <a:r>
+              <a:rPr lang="en-US" dirty="0"/>
+              <a:t>Non-proprietary and has an open-source reference implementation.</a:t>
+            </a:r>
             <a:endParaRPr dirty="0"/>
           </a:p>
         </p:txBody>
       </p:sp>
+      <p:pic>
+        <p:nvPicPr>
+          <p:cNvPr id="4" name="Picture 3" descr="A diagram of a flac and flac decoder&#10;&#10;Description automatically generated">
+            <a:extLst>
+              <a:ext uri="{FF2B5EF4-FFF2-40B4-BE49-F238E27FC236}">
+                <a16:creationId xmlns:a16="http://schemas.microsoft.com/office/drawing/2014/main" id="{427D65BA-9714-3645-DB92-916D6531C507}"/>
+              </a:ext>
+            </a:extLst>
+          </p:cNvPr>
+          <p:cNvPicPr>
+            <a:picLocks noChangeAspect="1"/>
+          </p:cNvPicPr>
+          <p:nvPr/>
+        </p:nvPicPr>
+        <p:blipFill>
+          <a:blip r:embed="rId3"/>
+          <a:stretch>
+            <a:fillRect/>
+          </a:stretch>
+        </p:blipFill>
+        <p:spPr>
+          <a:xfrm>
+            <a:off x="560011" y="2589622"/>
+            <a:ext cx="7969485" cy="2156879"/>
+          </a:xfrm>
+          <a:prstGeom prst="rect">
+            <a:avLst/>
+          </a:prstGeom>
+        </p:spPr>
+      </p:pic>
     </p:spTree>
   </p:cSld>
   <p:clrMapOvr>
@@ -10831,7 +10751,7 @@
   <p:cSld>
     <p:spTree>
       <p:nvGrpSpPr>
-        <p:cNvPr id="1" name="Shape 196"/>
+        <p:cNvPr id="1" name=""/>
         <p:cNvGrpSpPr/>
         <p:nvPr/>
       </p:nvGrpSpPr>
@@ -10845,75 +10765,107 @@
       </p:grpSpPr>
       <p:sp>
         <p:nvSpPr>
-          <p:cNvPr id="197" name="Google Shape;197;p37"/>
-          <p:cNvSpPr txBox="1">
+          <p:cNvPr id="3" name="Text Placeholder 2">
+            <a:extLst>
+              <a:ext uri="{FF2B5EF4-FFF2-40B4-BE49-F238E27FC236}">
+                <a16:creationId xmlns:a16="http://schemas.microsoft.com/office/drawing/2014/main" id="{6884F7B4-BF0C-E48C-8310-1686888182B6}"/>
+              </a:ext>
+            </a:extLst>
+          </p:cNvPr>
+          <p:cNvSpPr>
             <a:spLocks noGrp="1"/>
           </p:cNvSpPr>
           <p:nvPr>
-            <p:ph type="title"/>
+            <p:ph type="body" idx="1"/>
           </p:nvPr>
         </p:nvSpPr>
         <p:spPr>
           <a:xfrm>
-            <a:off x="311700" y="140225"/>
-            <a:ext cx="8520600" cy="572700"/>
-          </a:xfrm>
-          <a:prstGeom prst="rect">
-            <a:avLst/>
-          </a:prstGeom>
+            <a:off x="311700" y="467668"/>
+            <a:ext cx="8520600" cy="4261748"/>
+          </a:xfrm>
         </p:spPr>
         <p:txBody>
-          <a:bodyPr spcFirstLastPara="1" wrap="square" lIns="91425" tIns="91425" rIns="91425" bIns="91425" anchor="t" anchorCtr="0">
-            <a:normAutofit fontScale="90000"/>
+          <a:bodyPr>
+            <a:normAutofit lnSpcReduction="10000"/>
           </a:bodyPr>
           <a:lstStyle/>
           <a:p>
-            <a:pPr marL="0" lvl="0" indent="0" algn="l" rtl="0">
-              <a:spcBef>
-                <a:spcPts val="0"/>
-              </a:spcBef>
-              <a:spcAft>
-                <a:spcPts val="0"/>
-              </a:spcAft>
-              <a:buNone/>
-            </a:pPr>
-            <a:r>
-              <a:rPr lang="en"/>
-              <a:t>Lossless audio based on lossy audio scheme</a:t>
-            </a:r>
-            <a:endParaRPr/>
+            <a:r>
+              <a:rPr lang="en-US" b="1" dirty="0"/>
+              <a:t>Lossless: </a:t>
+            </a:r>
+            <a:r>
+              <a:rPr lang="en-US" dirty="0"/>
+              <a:t>The encoding of audio (PCM) data incurs no loss of information, and the decoded audio is bit-for-bit identical to what went into the encoder. </a:t>
+            </a:r>
+          </a:p>
+          <a:p>
+            <a:r>
+              <a:rPr lang="en-US" b="1" dirty="0"/>
+              <a:t>Fast: </a:t>
+            </a:r>
+            <a:r>
+              <a:rPr lang="en-US" dirty="0"/>
+              <a:t>FLAC is asymmetric in favor of decode speed. Decoding requires only integer arithmetic, and is much less compute-intensive than for most perceptual codecs. </a:t>
+            </a:r>
+          </a:p>
+          <a:p>
+            <a:r>
+              <a:rPr lang="en-US" b="1" dirty="0"/>
+              <a:t>Hardware support: </a:t>
+            </a:r>
+            <a:r>
+              <a:rPr lang="en-US" dirty="0"/>
+              <a:t>FLAC is supported by dozens of consumer electronic devices, from portable players, to home stereo equipment, to car stereo.</a:t>
+            </a:r>
+          </a:p>
+          <a:p>
+            <a:r>
+              <a:rPr lang="en-US" b="1" dirty="0"/>
+              <a:t>Flexible metadata: </a:t>
+            </a:r>
+            <a:r>
+              <a:rPr lang="en-US" dirty="0"/>
+              <a:t>FLAC's metadata system supports tags, cover art, seek tables, and cue sheets. Applications can write their own APPLICATION metadata once they register an ID. </a:t>
+            </a:r>
+          </a:p>
+          <a:p>
+            <a:r>
+              <a:rPr lang="en-US" b="1" dirty="0" err="1"/>
+              <a:t>Seekable</a:t>
+            </a:r>
+            <a:r>
+              <a:rPr lang="en-US" b="1" dirty="0"/>
+              <a:t>: </a:t>
+            </a:r>
+            <a:r>
+              <a:rPr lang="en-US" dirty="0"/>
+              <a:t>FLAC supports fast sample-accurate seeking. Not only is this useful for playback, it makes FLAC files suitable for use in editing applications.</a:t>
+            </a:r>
+          </a:p>
+          <a:p>
+            <a:r>
+              <a:rPr lang="en-US" b="1" dirty="0" err="1"/>
+              <a:t>Streamable</a:t>
+            </a:r>
+            <a:r>
+              <a:rPr lang="en-US" b="1" dirty="0"/>
+              <a:t>: </a:t>
+            </a:r>
+            <a:r>
+              <a:rPr lang="en-US" dirty="0"/>
+              <a:t>Each FLAC frame contains enough data to decode that frame. </a:t>
+            </a:r>
           </a:p>
         </p:txBody>
       </p:sp>
-      <p:pic>
-        <p:nvPicPr>
-          <p:cNvPr id="198" name="Google Shape;198;p37"/>
-          <p:cNvPicPr preferRelativeResize="0"/>
-          <p:nvPr/>
-        </p:nvPicPr>
-        <p:blipFill>
-          <a:blip r:embed="rId3">
-            <a:alphaModFix/>
-          </a:blip>
-          <a:stretch>
-            <a:fillRect/>
-          </a:stretch>
-        </p:blipFill>
-        <p:spPr>
-          <a:xfrm>
-            <a:off x="1392789" y="761000"/>
-            <a:ext cx="5603959" cy="4285027"/>
-          </a:xfrm>
-          <a:prstGeom prst="rect">
-            <a:avLst/>
-          </a:prstGeom>
-          <a:noFill/>
-          <a:ln>
-            <a:noFill/>
-          </a:ln>
-        </p:spPr>
-      </p:pic>
     </p:spTree>
+    <p:extLst>
+      <p:ext uri="{BB962C8B-B14F-4D97-AF65-F5344CB8AC3E}">
+        <p14:creationId xmlns:p14="http://schemas.microsoft.com/office/powerpoint/2010/main" val="1029473142"/>
+      </p:ext>
+    </p:extLst>
   </p:cSld>
   <p:clrMapOvr>
     <a:masterClrMapping/>
@@ -10922,6 +10874,106 @@
 </file>
 
 <file path=ppt/slides/slide26.xml><?xml version="1.0" encoding="utf-8"?>
+<p:sld xmlns:a="http://schemas.openxmlformats.org/drawingml/2006/main" xmlns:r="http://schemas.openxmlformats.org/officeDocument/2006/relationships" xmlns:p="http://schemas.openxmlformats.org/presentationml/2006/main">
+  <p:cSld>
+    <p:spTree>
+      <p:nvGrpSpPr>
+        <p:cNvPr id="1" name=""/>
+        <p:cNvGrpSpPr/>
+        <p:nvPr/>
+      </p:nvGrpSpPr>
+      <p:grpSpPr>
+        <a:xfrm>
+          <a:off x="0" y="0"/>
+          <a:ext cx="0" cy="0"/>
+          <a:chOff x="0" y="0"/>
+          <a:chExt cx="0" cy="0"/>
+        </a:xfrm>
+      </p:grpSpPr>
+      <p:sp>
+        <p:nvSpPr>
+          <p:cNvPr id="2" name="Title 1">
+            <a:extLst>
+              <a:ext uri="{FF2B5EF4-FFF2-40B4-BE49-F238E27FC236}">
+                <a16:creationId xmlns:a16="http://schemas.microsoft.com/office/drawing/2014/main" id="{77968E2E-7085-E047-7D48-0F2C4F772173}"/>
+              </a:ext>
+            </a:extLst>
+          </p:cNvPr>
+          <p:cNvSpPr>
+            <a:spLocks noGrp="1"/>
+          </p:cNvSpPr>
+          <p:nvPr>
+            <p:ph type="title"/>
+          </p:nvPr>
+        </p:nvSpPr>
+        <p:spPr/>
+        <p:txBody>
+          <a:bodyPr>
+            <a:normAutofit fontScale="90000"/>
+          </a:bodyPr>
+          <a:lstStyle/>
+          <a:p>
+            <a:r>
+              <a:rPr lang="en-US" dirty="0" err="1"/>
+              <a:t>FFmpeg</a:t>
+            </a:r>
+            <a:endParaRPr lang="en-US" dirty="0"/>
+          </a:p>
+        </p:txBody>
+      </p:sp>
+      <p:sp>
+        <p:nvSpPr>
+          <p:cNvPr id="3" name="Text Placeholder 2">
+            <a:extLst>
+              <a:ext uri="{FF2B5EF4-FFF2-40B4-BE49-F238E27FC236}">
+                <a16:creationId xmlns:a16="http://schemas.microsoft.com/office/drawing/2014/main" id="{F3627F21-852A-D198-374F-6F042768725A}"/>
+              </a:ext>
+            </a:extLst>
+          </p:cNvPr>
+          <p:cNvSpPr>
+            <a:spLocks noGrp="1"/>
+          </p:cNvSpPr>
+          <p:nvPr>
+            <p:ph type="body" idx="1"/>
+          </p:nvPr>
+        </p:nvSpPr>
+        <p:spPr/>
+        <p:txBody>
+          <a:bodyPr/>
+          <a:lstStyle/>
+          <a:p>
+            <a:r>
+              <a:rPr lang="en-US" dirty="0"/>
+              <a:t>A free and open-source software project consisting of a suite of libraries and programs for handling video, audio, and other multimedia files and streams. At its core is the command-line </a:t>
+            </a:r>
+            <a:r>
+              <a:rPr lang="en-US" dirty="0" err="1">
+                <a:latin typeface="Courier New" panose="02070309020205020404" pitchFamily="49" charset="0"/>
+                <a:cs typeface="Courier New" panose="02070309020205020404" pitchFamily="49" charset="0"/>
+              </a:rPr>
+              <a:t>ffmpeg</a:t>
+            </a:r>
+            <a:r>
+              <a:rPr lang="en-US" dirty="0"/>
+              <a:t> tool itself, designed for processing video and audio files. It is widely used for format transcoding, basic editing (trimming and concatenation), video scaling, video post-production effects, and standards compliance (SMPTE, ITU).</a:t>
+            </a:r>
+          </a:p>
+        </p:txBody>
+      </p:sp>
+    </p:spTree>
+    <p:extLst>
+      <p:ext uri="{BB962C8B-B14F-4D97-AF65-F5344CB8AC3E}">
+        <p14:creationId xmlns:p14="http://schemas.microsoft.com/office/powerpoint/2010/main" val="3861791739"/>
+      </p:ext>
+    </p:extLst>
+  </p:cSld>
+  <p:clrMapOvr>
+    <a:masterClrMapping/>
+  </p:clrMapOvr>
+</p:sld>
+</file>
+
+<file path=ppt/slides/slide27.xml><?xml version="1.0" encoding="utf-8"?>
 <p:sld xmlns:a="http://schemas.openxmlformats.org/drawingml/2006/main" xmlns:r="http://schemas.openxmlformats.org/officeDocument/2006/relationships" xmlns:p="http://schemas.openxmlformats.org/presentationml/2006/main">
   <p:cSld>
     <p:spTree>
@@ -11005,16 +11057,44 @@
           <a:p>
             <a:r>
               <a:rPr lang="en-US" dirty="0"/>
-              <a:t>“Chapter 11: Lossless audio coding and digital watermarking” in Andreas </a:t>
-            </a:r>
+              <a:t>Free lossless audio codec: </a:t>
+            </a:r>
+            <a:r>
+              <a:rPr lang="en-US" dirty="0">
+                <a:hlinkClick r:id="rId2"/>
+              </a:rPr>
+              <a:t>https://xiph.org/flac/</a:t>
+            </a:r>
+            <a:endParaRPr lang="en-US" dirty="0"/>
+          </a:p>
+          <a:p>
             <a:r>
               <a:rPr lang="en-US" dirty="0" err="1"/>
-              <a:t>Spanias</a:t>
+              <a:t>FFmpeg</a:t>
             </a:r>
             <a:r>
               <a:rPr lang="en-US" dirty="0"/>
-              <a:t>, Ted Painter, and Venkatraman Atti (2007). Audio Signal Processing and Coding. John Wiley &amp; Sons, Inc.</a:t>
-            </a:r>
+              <a:t>: </a:t>
+            </a:r>
+            <a:r>
+              <a:rPr lang="en-US" dirty="0">
+                <a:hlinkClick r:id="rId3"/>
+              </a:rPr>
+              <a:t>https://</a:t>
+            </a:r>
+            <a:r>
+              <a:rPr lang="en-US" dirty="0" err="1">
+                <a:hlinkClick r:id="rId3"/>
+              </a:rPr>
+              <a:t>www.ffmpeg.org</a:t>
+            </a:r>
+            <a:r>
+              <a:rPr lang="en-US" dirty="0">
+                <a:hlinkClick r:id="rId3"/>
+              </a:rPr>
+              <a:t>/</a:t>
+            </a:r>
+            <a:endParaRPr lang="en-US" dirty="0"/>
           </a:p>
           <a:p>
             <a:endParaRPr lang="en-US" dirty="0"/>
@@ -11878,10 +11958,22 @@
               <a:buChar char="●"/>
             </a:pPr>
             <a:r>
-              <a:rPr lang="en"/>
-              <a:t>Filter bank: Hybrid filter bank. Polyphase filterbank (as used in Layer-1 and Layer2) followed by a Modified Discrete Cosine Transform (MDCT).</a:t>
-            </a:r>
-            <a:endParaRPr/>
+              <a:rPr lang="en" b="1" dirty="0"/>
+              <a:t>Filter bank: </a:t>
+            </a:r>
+            <a:r>
+              <a:rPr lang="en" dirty="0"/>
+              <a:t>Hybrid filter bank. Polyphase </a:t>
+            </a:r>
+            <a:r>
+              <a:rPr lang="en" dirty="0" err="1"/>
+              <a:t>filterbank</a:t>
+            </a:r>
+            <a:r>
+              <a:rPr lang="en" dirty="0"/>
+              <a:t> (as used in Layer-1 and Layer2) followed by a Modified Discrete Cosine Transform (MDCT).</a:t>
+            </a:r>
+            <a:endParaRPr dirty="0"/>
           </a:p>
           <a:p>
             <a:pPr marL="457200" lvl="0" indent="-342900" algn="l" rtl="0">
@@ -11895,10 +11987,14 @@
               <a:buChar char="●"/>
             </a:pPr>
             <a:r>
-              <a:rPr lang="en"/>
-              <a:t>Perceptual model to identify masking thresholds based on critical bands of human hearing and using the FFT.</a:t>
-            </a:r>
-            <a:endParaRPr/>
+              <a:rPr lang="en" b="1" dirty="0"/>
+              <a:t>Perceptual model </a:t>
+            </a:r>
+            <a:r>
+              <a:rPr lang="en" dirty="0"/>
+              <a:t>to identify masking thresholds based on critical bands of human hearing and using the FFT.</a:t>
+            </a:r>
+            <a:endParaRPr dirty="0"/>
           </a:p>
           <a:p>
             <a:pPr marL="457200" lvl="0" indent="-342900" algn="l" rtl="0">
@@ -11912,10 +12008,14 @@
               <a:buChar char="●"/>
             </a:pPr>
             <a:r>
-              <a:rPr lang="en"/>
-              <a:t>Quantization and coding: Two nested iteration loops. Use of Huffman coding.</a:t>
-            </a:r>
-            <a:endParaRPr/>
+              <a:rPr lang="en" b="1" dirty="0"/>
+              <a:t>Quantization and coding: </a:t>
+            </a:r>
+            <a:r>
+              <a:rPr lang="en" dirty="0"/>
+              <a:t>Two nested iteration loops. Use of Huffman coding.</a:t>
+            </a:r>
+            <a:endParaRPr dirty="0"/>
           </a:p>
           <a:p>
             <a:pPr marL="0" lvl="0" indent="0" algn="l" rtl="0">
@@ -11927,7 +12027,7 @@
               </a:spcAft>
               <a:buNone/>
             </a:pPr>
-            <a:endParaRPr/>
+            <a:endParaRPr dirty="0"/>
           </a:p>
         </p:txBody>
       </p:sp>

</xml_diff>